<commit_message>
pico poster fixed NIST
</commit_message>
<xml_diff>
--- a/Poster/PICO_poster_SPIE2018.pptx
+++ b/Poster/PICO_poster_SPIE2018.pptx
@@ -8278,7 +8278,29 @@
                 </a:solidFill>
                 <a:latin typeface="+mj-lt"/>
               </a:rPr>
-              <a:t>National Institute of Science and Technology, </a:t>
+              <a:t>National Institute </a:t>
+            </a:r>
+            <a:r>
+              <a:rPr lang="en-US" altLang="en-US" sz="2800">
+                <a:solidFill>
+                  <a:schemeClr val="tx2">
+                    <a:lumMod val="50000"/>
+                  </a:schemeClr>
+                </a:solidFill>
+                <a:latin typeface="+mj-lt"/>
+              </a:rPr>
+              <a:t>of Standards </a:t>
+            </a:r>
+            <a:r>
+              <a:rPr lang="en-US" altLang="en-US" sz="2800" dirty="0">
+                <a:solidFill>
+                  <a:schemeClr val="tx2">
+                    <a:lumMod val="50000"/>
+                  </a:schemeClr>
+                </a:solidFill>
+                <a:latin typeface="+mj-lt"/>
+              </a:rPr>
+              <a:t>and Technology, </a:t>
             </a:r>
           </a:p>
           <a:p>

</xml_diff>